<commit_message>
modify font of soft skills slide
</commit_message>
<xml_diff>
--- a/The Philosophy of Soft Skills/Factorio的基地佈局列舉.pptx
+++ b/The Philosophy of Soft Skills/Factorio的基地佈局列舉.pptx
@@ -119,6 +119,11 @@
       </a:defRPr>
     </a:lvl9pPr>
   </p:defaultTextStyle>
+  <p:extLst>
+    <p:ext uri="{EFAFB233-063F-42B5-8137-9DF3F51BA10A}">
+      <p15:sldGuideLst xmlns:p15="http://schemas.microsoft.com/office/powerpoint/2012/main"/>
+    </p:ext>
+  </p:extLst>
 </p:presentation>
 </file>
 
@@ -204,7 +209,7 @@
           <a:p>
             <a:fld id="{70303110-A4D9-4EE1-BAF2-A87983BE13EA}" type="datetimeFigureOut">
               <a:rPr lang="zh-TW" altLang="en-US" smtClean="0"/>
-              <a:t>2024/10/15</a:t>
+              <a:t>2024/10/22</a:t>
             </a:fld>
             <a:endParaRPr lang="zh-TW" altLang="en-US"/>
           </a:p>
@@ -618,7 +623,7 @@
           <a:p>
             <a:fld id="{ABA89292-F73E-450B-A4BA-5B4583E45DAA}" type="datetime1">
               <a:rPr lang="zh-TW" altLang="en-US" smtClean="0"/>
-              <a:t>2024/10/15</a:t>
+              <a:t>2024/10/22</a:t>
             </a:fld>
             <a:endParaRPr lang="zh-TW" altLang="en-US"/>
           </a:p>
@@ -816,7 +821,7 @@
           <a:p>
             <a:fld id="{591D3159-F51E-4E4B-8EB7-9E5D7C257AAA}" type="datetime1">
               <a:rPr lang="zh-TW" altLang="en-US" smtClean="0"/>
-              <a:t>2024/10/15</a:t>
+              <a:t>2024/10/22</a:t>
             </a:fld>
             <a:endParaRPr lang="zh-TW" altLang="en-US"/>
           </a:p>
@@ -1024,7 +1029,7 @@
           <a:p>
             <a:fld id="{4CD686A2-40D7-4ED1-9BF2-374FBC1BACE8}" type="datetime1">
               <a:rPr lang="zh-TW" altLang="en-US" smtClean="0"/>
-              <a:t>2024/10/15</a:t>
+              <a:t>2024/10/22</a:t>
             </a:fld>
             <a:endParaRPr lang="zh-TW" altLang="en-US"/>
           </a:p>
@@ -1222,7 +1227,7 @@
           <a:p>
             <a:fld id="{8B953712-B8AA-402F-9591-27721A27243C}" type="datetime1">
               <a:rPr lang="zh-TW" altLang="en-US" smtClean="0"/>
-              <a:t>2024/10/15</a:t>
+              <a:t>2024/10/22</a:t>
             </a:fld>
             <a:endParaRPr lang="zh-TW" altLang="en-US"/>
           </a:p>
@@ -1497,7 +1502,7 @@
           <a:p>
             <a:fld id="{67A67195-6DE6-42C2-9A0D-5A0013A90484}" type="datetime1">
               <a:rPr lang="zh-TW" altLang="en-US" smtClean="0"/>
-              <a:t>2024/10/15</a:t>
+              <a:t>2024/10/22</a:t>
             </a:fld>
             <a:endParaRPr lang="zh-TW" altLang="en-US"/>
           </a:p>
@@ -1762,7 +1767,7 @@
           <a:p>
             <a:fld id="{90AC46B6-0430-4375-AFFB-319755EEAB05}" type="datetime1">
               <a:rPr lang="zh-TW" altLang="en-US" smtClean="0"/>
-              <a:t>2024/10/15</a:t>
+              <a:t>2024/10/22</a:t>
             </a:fld>
             <a:endParaRPr lang="zh-TW" altLang="en-US"/>
           </a:p>
@@ -2174,7 +2179,7 @@
           <a:p>
             <a:fld id="{1A4E20C0-7856-48E5-928E-F73E4EB18D84}" type="datetime1">
               <a:rPr lang="zh-TW" altLang="en-US" smtClean="0"/>
-              <a:t>2024/10/15</a:t>
+              <a:t>2024/10/22</a:t>
             </a:fld>
             <a:endParaRPr lang="zh-TW" altLang="en-US"/>
           </a:p>
@@ -2315,7 +2320,7 @@
           <a:p>
             <a:fld id="{4E9FF7D1-CB50-45D4-AAAA-661C7AC906C3}" type="datetime1">
               <a:rPr lang="zh-TW" altLang="en-US" smtClean="0"/>
-              <a:t>2024/10/15</a:t>
+              <a:t>2024/10/22</a:t>
             </a:fld>
             <a:endParaRPr lang="zh-TW" altLang="en-US"/>
           </a:p>
@@ -2428,7 +2433,7 @@
           <a:p>
             <a:fld id="{6F070C67-2423-4BD2-8B1B-65C9F5CFFCB7}" type="datetime1">
               <a:rPr lang="zh-TW" altLang="en-US" smtClean="0"/>
-              <a:t>2024/10/15</a:t>
+              <a:t>2024/10/22</a:t>
             </a:fld>
             <a:endParaRPr lang="zh-TW" altLang="en-US"/>
           </a:p>
@@ -2739,7 +2744,7 @@
           <a:p>
             <a:fld id="{E3877F15-DC00-481C-A8E5-E6B83C8BEAAE}" type="datetime1">
               <a:rPr lang="zh-TW" altLang="en-US" smtClean="0"/>
-              <a:t>2024/10/15</a:t>
+              <a:t>2024/10/22</a:t>
             </a:fld>
             <a:endParaRPr lang="zh-TW" altLang="en-US"/>
           </a:p>
@@ -3027,7 +3032,7 @@
           <a:p>
             <a:fld id="{6A8B4C6F-2217-46F4-B55F-0A146A0B1B06}" type="datetime1">
               <a:rPr lang="zh-TW" altLang="en-US" smtClean="0"/>
-              <a:t>2024/10/15</a:t>
+              <a:t>2024/10/22</a:t>
             </a:fld>
             <a:endParaRPr lang="zh-TW" altLang="en-US"/>
           </a:p>
@@ -3104,9 +3109,19 @@
 <p:sldMaster xmlns:a="http://schemas.openxmlformats.org/drawingml/2006/main" xmlns:r="http://schemas.openxmlformats.org/officeDocument/2006/relationships" xmlns:p="http://schemas.openxmlformats.org/presentationml/2006/main">
   <p:cSld>
     <p:bg>
-      <p:bgRef idx="1001">
-        <a:schemeClr val="bg1"/>
-      </p:bgRef>
+      <p:bgPr>
+        <a:blipFill dpi="0" rotWithShape="1">
+          <a:blip r:embed="rId13">
+            <a:alphaModFix amt="36000"/>
+            <a:lum/>
+          </a:blip>
+          <a:srcRect/>
+          <a:stretch>
+            <a:fillRect t="-39000" b="-39000"/>
+          </a:stretch>
+        </a:blipFill>
+        <a:effectLst/>
+      </p:bgPr>
     </p:bg>
     <p:spTree>
       <p:nvGrpSpPr>
@@ -3268,7 +3283,7 @@
           <a:p>
             <a:fld id="{5A660A1F-2E0A-4E87-AFB1-5993162DB6BC}" type="datetime1">
               <a:rPr lang="zh-TW" altLang="en-US" smtClean="0"/>
-              <a:t>2024/10/15</a:t>
+              <a:t>2024/10/22</a:t>
             </a:fld>
             <a:endParaRPr lang="zh-TW" altLang="en-US"/>
           </a:p>
@@ -3400,8 +3415,8 @@
           <a:solidFill>
             <a:schemeClr val="tx1"/>
           </a:solidFill>
-          <a:latin typeface="+mj-lt"/>
-          <a:ea typeface="+mj-ea"/>
+          <a:latin typeface="Adobe 黑体 Std R" panose="020B0400000000000000" pitchFamily="34" charset="-128"/>
+          <a:ea typeface="Adobe 黑体 Std R" panose="020B0400000000000000" pitchFamily="34" charset="-128"/>
           <a:cs typeface="+mj-cs"/>
         </a:defRPr>
       </a:lvl1pPr>
@@ -3420,8 +3435,8 @@
           <a:solidFill>
             <a:schemeClr val="tx1"/>
           </a:solidFill>
-          <a:latin typeface="+mn-lt"/>
-          <a:ea typeface="+mn-ea"/>
+          <a:latin typeface="Adobe 黑体 Std R" panose="020B0400000000000000" pitchFamily="34" charset="-128"/>
+          <a:ea typeface="Adobe 黑体 Std R" panose="020B0400000000000000" pitchFamily="34" charset="-128"/>
           <a:cs typeface="+mn-cs"/>
         </a:defRPr>
       </a:lvl1pPr>
@@ -3438,8 +3453,8 @@
           <a:solidFill>
             <a:schemeClr val="tx1"/>
           </a:solidFill>
-          <a:latin typeface="+mn-lt"/>
-          <a:ea typeface="+mn-ea"/>
+          <a:latin typeface="Adobe 黑体 Std R" panose="020B0400000000000000" pitchFamily="34" charset="-128"/>
+          <a:ea typeface="Adobe 黑体 Std R" panose="020B0400000000000000" pitchFamily="34" charset="-128"/>
           <a:cs typeface="+mn-cs"/>
         </a:defRPr>
       </a:lvl2pPr>
@@ -3456,8 +3471,8 @@
           <a:solidFill>
             <a:schemeClr val="tx1"/>
           </a:solidFill>
-          <a:latin typeface="+mn-lt"/>
-          <a:ea typeface="+mn-ea"/>
+          <a:latin typeface="Adobe 黑体 Std R" panose="020B0400000000000000" pitchFamily="34" charset="-128"/>
+          <a:ea typeface="Adobe 黑体 Std R" panose="020B0400000000000000" pitchFamily="34" charset="-128"/>
           <a:cs typeface="+mn-cs"/>
         </a:defRPr>
       </a:lvl3pPr>
@@ -3474,8 +3489,8 @@
           <a:solidFill>
             <a:schemeClr val="tx1"/>
           </a:solidFill>
-          <a:latin typeface="+mn-lt"/>
-          <a:ea typeface="+mn-ea"/>
+          <a:latin typeface="Adobe 黑体 Std R" panose="020B0400000000000000" pitchFamily="34" charset="-128"/>
+          <a:ea typeface="Adobe 黑体 Std R" panose="020B0400000000000000" pitchFamily="34" charset="-128"/>
           <a:cs typeface="+mn-cs"/>
         </a:defRPr>
       </a:lvl4pPr>
@@ -3492,8 +3507,8 @@
           <a:solidFill>
             <a:schemeClr val="tx1"/>
           </a:solidFill>
-          <a:latin typeface="+mn-lt"/>
-          <a:ea typeface="+mn-ea"/>
+          <a:latin typeface="Adobe 黑体 Std R" panose="020B0400000000000000" pitchFamily="34" charset="-128"/>
+          <a:ea typeface="Adobe 黑体 Std R" panose="020B0400000000000000" pitchFamily="34" charset="-128"/>
           <a:cs typeface="+mn-cs"/>
         </a:defRPr>
       </a:lvl5pPr>
@@ -5157,6 +5172,431 @@
   <p:clrMapOvr>
     <a:masterClrMapping/>
   </p:clrMapOvr>
+  <p:timing>
+    <p:tnLst>
+      <p:par>
+        <p:cTn id="1" dur="indefinite" restart="never" nodeType="tmRoot">
+          <p:childTnLst>
+            <p:seq concurrent="1" nextAc="seek">
+              <p:cTn id="2" dur="indefinite" nodeType="mainSeq">
+                <p:childTnLst>
+                  <p:par>
+                    <p:cTn id="3" fill="hold">
+                      <p:stCondLst>
+                        <p:cond delay="indefinite"/>
+                      </p:stCondLst>
+                      <p:childTnLst>
+                        <p:par>
+                          <p:cTn id="4" fill="hold">
+                            <p:stCondLst>
+                              <p:cond delay="0"/>
+                            </p:stCondLst>
+                            <p:childTnLst>
+                              <p:par>
+                                <p:cTn id="5" presetID="1" presetClass="entr" presetSubtype="0" fill="hold" nodeType="clickEffect">
+                                  <p:stCondLst>
+                                    <p:cond delay="0"/>
+                                  </p:stCondLst>
+                                  <p:childTnLst>
+                                    <p:set>
+                                      <p:cBhvr>
+                                        <p:cTn id="6" dur="1" fill="hold">
+                                          <p:stCondLst>
+                                            <p:cond delay="0"/>
+                                          </p:stCondLst>
+                                        </p:cTn>
+                                        <p:tgtEl>
+                                          <p:spTgt spid="3">
+                                            <p:txEl>
+                                              <p:pRg st="0" end="0"/>
+                                            </p:txEl>
+                                          </p:spTgt>
+                                        </p:tgtEl>
+                                        <p:attrNameLst>
+                                          <p:attrName>style.visibility</p:attrName>
+                                        </p:attrNameLst>
+                                      </p:cBhvr>
+                                      <p:to>
+                                        <p:strVal val="visible"/>
+                                      </p:to>
+                                    </p:set>
+                                  </p:childTnLst>
+                                </p:cTn>
+                              </p:par>
+                            </p:childTnLst>
+                          </p:cTn>
+                        </p:par>
+                      </p:childTnLst>
+                    </p:cTn>
+                  </p:par>
+                  <p:par>
+                    <p:cTn id="7" fill="hold">
+                      <p:stCondLst>
+                        <p:cond delay="indefinite"/>
+                      </p:stCondLst>
+                      <p:childTnLst>
+                        <p:par>
+                          <p:cTn id="8" fill="hold">
+                            <p:stCondLst>
+                              <p:cond delay="0"/>
+                            </p:stCondLst>
+                            <p:childTnLst>
+                              <p:par>
+                                <p:cTn id="9" presetID="1" presetClass="entr" presetSubtype="0" fill="hold" nodeType="clickEffect">
+                                  <p:stCondLst>
+                                    <p:cond delay="0"/>
+                                  </p:stCondLst>
+                                  <p:childTnLst>
+                                    <p:set>
+                                      <p:cBhvr>
+                                        <p:cTn id="10" dur="1" fill="hold">
+                                          <p:stCondLst>
+                                            <p:cond delay="0"/>
+                                          </p:stCondLst>
+                                        </p:cTn>
+                                        <p:tgtEl>
+                                          <p:spTgt spid="3">
+                                            <p:txEl>
+                                              <p:pRg st="1" end="1"/>
+                                            </p:txEl>
+                                          </p:spTgt>
+                                        </p:tgtEl>
+                                        <p:attrNameLst>
+                                          <p:attrName>style.visibility</p:attrName>
+                                        </p:attrNameLst>
+                                      </p:cBhvr>
+                                      <p:to>
+                                        <p:strVal val="visible"/>
+                                      </p:to>
+                                    </p:set>
+                                  </p:childTnLst>
+                                </p:cTn>
+                              </p:par>
+                            </p:childTnLst>
+                          </p:cTn>
+                        </p:par>
+                      </p:childTnLst>
+                    </p:cTn>
+                  </p:par>
+                  <p:par>
+                    <p:cTn id="11" fill="hold">
+                      <p:stCondLst>
+                        <p:cond delay="indefinite"/>
+                      </p:stCondLst>
+                      <p:childTnLst>
+                        <p:par>
+                          <p:cTn id="12" fill="hold">
+                            <p:stCondLst>
+                              <p:cond delay="0"/>
+                            </p:stCondLst>
+                            <p:childTnLst>
+                              <p:par>
+                                <p:cTn id="13" presetID="1" presetClass="entr" presetSubtype="0" fill="hold" nodeType="clickEffect">
+                                  <p:stCondLst>
+                                    <p:cond delay="0"/>
+                                  </p:stCondLst>
+                                  <p:childTnLst>
+                                    <p:set>
+                                      <p:cBhvr>
+                                        <p:cTn id="14" dur="1" fill="hold">
+                                          <p:stCondLst>
+                                            <p:cond delay="0"/>
+                                          </p:stCondLst>
+                                        </p:cTn>
+                                        <p:tgtEl>
+                                          <p:spTgt spid="13"/>
+                                        </p:tgtEl>
+                                        <p:attrNameLst>
+                                          <p:attrName>style.visibility</p:attrName>
+                                        </p:attrNameLst>
+                                      </p:cBhvr>
+                                      <p:to>
+                                        <p:strVal val="visible"/>
+                                      </p:to>
+                                    </p:set>
+                                  </p:childTnLst>
+                                </p:cTn>
+                              </p:par>
+                              <p:par>
+                                <p:cTn id="15" presetID="1" presetClass="entr" presetSubtype="0" fill="hold" grpId="0" nodeType="withEffect">
+                                  <p:stCondLst>
+                                    <p:cond delay="0"/>
+                                  </p:stCondLst>
+                                  <p:childTnLst>
+                                    <p:set>
+                                      <p:cBhvr>
+                                        <p:cTn id="16" dur="1" fill="hold">
+                                          <p:stCondLst>
+                                            <p:cond delay="0"/>
+                                          </p:stCondLst>
+                                        </p:cTn>
+                                        <p:tgtEl>
+                                          <p:spTgt spid="12"/>
+                                        </p:tgtEl>
+                                        <p:attrNameLst>
+                                          <p:attrName>style.visibility</p:attrName>
+                                        </p:attrNameLst>
+                                      </p:cBhvr>
+                                      <p:to>
+                                        <p:strVal val="visible"/>
+                                      </p:to>
+                                    </p:set>
+                                  </p:childTnLst>
+                                </p:cTn>
+                              </p:par>
+                              <p:par>
+                                <p:cTn id="17" presetID="1" presetClass="entr" presetSubtype="0" fill="hold" nodeType="withEffect">
+                                  <p:stCondLst>
+                                    <p:cond delay="0"/>
+                                  </p:stCondLst>
+                                  <p:childTnLst>
+                                    <p:set>
+                                      <p:cBhvr>
+                                        <p:cTn id="18" dur="1" fill="hold">
+                                          <p:stCondLst>
+                                            <p:cond delay="0"/>
+                                          </p:stCondLst>
+                                        </p:cTn>
+                                        <p:tgtEl>
+                                          <p:spTgt spid="27"/>
+                                        </p:tgtEl>
+                                        <p:attrNameLst>
+                                          <p:attrName>style.visibility</p:attrName>
+                                        </p:attrNameLst>
+                                      </p:cBhvr>
+                                      <p:to>
+                                        <p:strVal val="visible"/>
+                                      </p:to>
+                                    </p:set>
+                                  </p:childTnLst>
+                                </p:cTn>
+                              </p:par>
+                              <p:par>
+                                <p:cTn id="19" presetID="1" presetClass="entr" presetSubtype="0" fill="hold" nodeType="withEffect">
+                                  <p:stCondLst>
+                                    <p:cond delay="0"/>
+                                  </p:stCondLst>
+                                  <p:childTnLst>
+                                    <p:set>
+                                      <p:cBhvr>
+                                        <p:cTn id="20" dur="1" fill="hold">
+                                          <p:stCondLst>
+                                            <p:cond delay="0"/>
+                                          </p:stCondLst>
+                                        </p:cTn>
+                                        <p:tgtEl>
+                                          <p:spTgt spid="14"/>
+                                        </p:tgtEl>
+                                        <p:attrNameLst>
+                                          <p:attrName>style.visibility</p:attrName>
+                                        </p:attrNameLst>
+                                      </p:cBhvr>
+                                      <p:to>
+                                        <p:strVal val="visible"/>
+                                      </p:to>
+                                    </p:set>
+                                  </p:childTnLst>
+                                </p:cTn>
+                              </p:par>
+                              <p:par>
+                                <p:cTn id="21" presetID="1" presetClass="entr" presetSubtype="0" fill="hold" grpId="0" nodeType="withEffect">
+                                  <p:stCondLst>
+                                    <p:cond delay="0"/>
+                                  </p:stCondLst>
+                                  <p:childTnLst>
+                                    <p:set>
+                                      <p:cBhvr>
+                                        <p:cTn id="22" dur="1" fill="hold">
+                                          <p:stCondLst>
+                                            <p:cond delay="0"/>
+                                          </p:stCondLst>
+                                        </p:cTn>
+                                        <p:tgtEl>
+                                          <p:spTgt spid="24"/>
+                                        </p:tgtEl>
+                                        <p:attrNameLst>
+                                          <p:attrName>style.visibility</p:attrName>
+                                        </p:attrNameLst>
+                                      </p:cBhvr>
+                                      <p:to>
+                                        <p:strVal val="visible"/>
+                                      </p:to>
+                                    </p:set>
+                                  </p:childTnLst>
+                                </p:cTn>
+                              </p:par>
+                              <p:par>
+                                <p:cTn id="23" presetID="1" presetClass="entr" presetSubtype="0" fill="hold" nodeType="withEffect">
+                                  <p:stCondLst>
+                                    <p:cond delay="0"/>
+                                  </p:stCondLst>
+                                  <p:childTnLst>
+                                    <p:set>
+                                      <p:cBhvr>
+                                        <p:cTn id="24" dur="1" fill="hold">
+                                          <p:stCondLst>
+                                            <p:cond delay="0"/>
+                                          </p:stCondLst>
+                                        </p:cTn>
+                                        <p:tgtEl>
+                                          <p:spTgt spid="28"/>
+                                        </p:tgtEl>
+                                        <p:attrNameLst>
+                                          <p:attrName>style.visibility</p:attrName>
+                                        </p:attrNameLst>
+                                      </p:cBhvr>
+                                      <p:to>
+                                        <p:strVal val="visible"/>
+                                      </p:to>
+                                    </p:set>
+                                  </p:childTnLst>
+                                </p:cTn>
+                              </p:par>
+                              <p:par>
+                                <p:cTn id="25" presetID="1" presetClass="entr" presetSubtype="0" fill="hold" nodeType="withEffect">
+                                  <p:stCondLst>
+                                    <p:cond delay="0"/>
+                                  </p:stCondLst>
+                                  <p:childTnLst>
+                                    <p:set>
+                                      <p:cBhvr>
+                                        <p:cTn id="26" dur="1" fill="hold">
+                                          <p:stCondLst>
+                                            <p:cond delay="0"/>
+                                          </p:stCondLst>
+                                        </p:cTn>
+                                        <p:tgtEl>
+                                          <p:spTgt spid="19"/>
+                                        </p:tgtEl>
+                                        <p:attrNameLst>
+                                          <p:attrName>style.visibility</p:attrName>
+                                        </p:attrNameLst>
+                                      </p:cBhvr>
+                                      <p:to>
+                                        <p:strVal val="visible"/>
+                                      </p:to>
+                                    </p:set>
+                                  </p:childTnLst>
+                                </p:cTn>
+                              </p:par>
+                              <p:par>
+                                <p:cTn id="27" presetID="1" presetClass="entr" presetSubtype="0" fill="hold" grpId="0" nodeType="withEffect">
+                                  <p:stCondLst>
+                                    <p:cond delay="0"/>
+                                  </p:stCondLst>
+                                  <p:childTnLst>
+                                    <p:set>
+                                      <p:cBhvr>
+                                        <p:cTn id="28" dur="1" fill="hold">
+                                          <p:stCondLst>
+                                            <p:cond delay="0"/>
+                                          </p:stCondLst>
+                                        </p:cTn>
+                                        <p:tgtEl>
+                                          <p:spTgt spid="25"/>
+                                        </p:tgtEl>
+                                        <p:attrNameLst>
+                                          <p:attrName>style.visibility</p:attrName>
+                                        </p:attrNameLst>
+                                      </p:cBhvr>
+                                      <p:to>
+                                        <p:strVal val="visible"/>
+                                      </p:to>
+                                    </p:set>
+                                  </p:childTnLst>
+                                </p:cTn>
+                              </p:par>
+                              <p:par>
+                                <p:cTn id="29" presetID="1" presetClass="entr" presetSubtype="0" fill="hold" nodeType="withEffect">
+                                  <p:stCondLst>
+                                    <p:cond delay="0"/>
+                                  </p:stCondLst>
+                                  <p:childTnLst>
+                                    <p:set>
+                                      <p:cBhvr>
+                                        <p:cTn id="30" dur="1" fill="hold">
+                                          <p:stCondLst>
+                                            <p:cond delay="0"/>
+                                          </p:stCondLst>
+                                        </p:cTn>
+                                        <p:tgtEl>
+                                          <p:spTgt spid="31"/>
+                                        </p:tgtEl>
+                                        <p:attrNameLst>
+                                          <p:attrName>style.visibility</p:attrName>
+                                        </p:attrNameLst>
+                                      </p:cBhvr>
+                                      <p:to>
+                                        <p:strVal val="visible"/>
+                                      </p:to>
+                                    </p:set>
+                                  </p:childTnLst>
+                                </p:cTn>
+                              </p:par>
+                              <p:par>
+                                <p:cTn id="31" presetID="1" presetClass="entr" presetSubtype="0" fill="hold" nodeType="withEffect">
+                                  <p:stCondLst>
+                                    <p:cond delay="0"/>
+                                  </p:stCondLst>
+                                  <p:childTnLst>
+                                    <p:set>
+                                      <p:cBhvr>
+                                        <p:cTn id="32" dur="1" fill="hold">
+                                          <p:stCondLst>
+                                            <p:cond delay="0"/>
+                                          </p:stCondLst>
+                                        </p:cTn>
+                                        <p:tgtEl>
+                                          <p:spTgt spid="3">
+                                            <p:txEl>
+                                              <p:pRg st="2" end="2"/>
+                                            </p:txEl>
+                                          </p:spTgt>
+                                        </p:tgtEl>
+                                        <p:attrNameLst>
+                                          <p:attrName>style.visibility</p:attrName>
+                                        </p:attrNameLst>
+                                      </p:cBhvr>
+                                      <p:to>
+                                        <p:strVal val="visible"/>
+                                      </p:to>
+                                    </p:set>
+                                  </p:childTnLst>
+                                </p:cTn>
+                              </p:par>
+                            </p:childTnLst>
+                          </p:cTn>
+                        </p:par>
+                      </p:childTnLst>
+                    </p:cTn>
+                  </p:par>
+                </p:childTnLst>
+              </p:cTn>
+              <p:prevCondLst>
+                <p:cond evt="onPrev" delay="0">
+                  <p:tgtEl>
+                    <p:sldTgt/>
+                  </p:tgtEl>
+                </p:cond>
+              </p:prevCondLst>
+              <p:nextCondLst>
+                <p:cond evt="onNext" delay="0">
+                  <p:tgtEl>
+                    <p:sldTgt/>
+                  </p:tgtEl>
+                </p:cond>
+              </p:nextCondLst>
+            </p:seq>
+          </p:childTnLst>
+        </p:cTn>
+      </p:par>
+    </p:tnLst>
+    <p:bldLst>
+      <p:bldP spid="12" grpId="0"/>
+      <p:bldP spid="24" grpId="0"/>
+      <p:bldP spid="25" grpId="0"/>
+    </p:bldLst>
+  </p:timing>
 </p:sld>
 </file>
 

</xml_diff>